<commit_message>
ATUALIZAÇÃO DO DEZ PÁGINAS - FIGURAS Inclusão de figuras e pouca alteração do texto.
</commit_message>
<xml_diff>
--- a/Enche Balde Página única 2019.11.12 v0.pptx
+++ b/Enche Balde Página única 2019.11.12 v0.pptx
@@ -5,8 +5,8 @@
     <p:sldMasterId id="2147483648" r:id="rId1"/>
   </p:sldMasterIdLst>
   <p:sldIdLst>
-    <p:sldId id="256" r:id="rId2"/>
-    <p:sldId id="257" r:id="rId3"/>
+    <p:sldId id="257" r:id="rId2"/>
+    <p:sldId id="258" r:id="rId3"/>
   </p:sldIdLst>
   <p:sldSz cx="12192000" cy="6858000"/>
   <p:notesSz cx="6858000" cy="9144000"/>
@@ -3340,58 +3340,546 @@
       </p:grpSpPr>
       <p:sp>
         <p:nvSpPr>
-          <p:cNvPr id="2" name="Título 1">
-            <a:extLst>
-              <a:ext uri="{FF2B5EF4-FFF2-40B4-BE49-F238E27FC236}">
-                <a16:creationId xmlns:a16="http://schemas.microsoft.com/office/drawing/2014/main" id="{98610849-B940-4438-98C5-446B190B2A08}"/>
-              </a:ext>
-            </a:extLst>
-          </p:cNvPr>
-          <p:cNvSpPr>
-            <a:spLocks noGrp="1"/>
-          </p:cNvSpPr>
-          <p:nvPr>
-            <p:ph type="ctrTitle"/>
-          </p:nvPr>
-        </p:nvSpPr>
-        <p:spPr/>
-        <p:txBody>
-          <a:bodyPr/>
-          <a:lstStyle/>
-          <a:p>
-            <a:endParaRPr lang="pt-BR"/>
-          </a:p>
-        </p:txBody>
-      </p:sp>
-      <p:sp>
-        <p:nvSpPr>
-          <p:cNvPr id="3" name="Subtítulo 2">
-            <a:extLst>
-              <a:ext uri="{FF2B5EF4-FFF2-40B4-BE49-F238E27FC236}">
-                <a16:creationId xmlns:a16="http://schemas.microsoft.com/office/drawing/2014/main" id="{2D8F6927-2A94-4866-9629-AE45033A170B}"/>
-              </a:ext>
-            </a:extLst>
-          </p:cNvPr>
-          <p:cNvSpPr>
-            <a:spLocks noGrp="1"/>
-          </p:cNvSpPr>
-          <p:nvPr>
-            <p:ph type="subTitle" idx="1"/>
-          </p:nvPr>
-        </p:nvSpPr>
-        <p:spPr/>
-        <p:txBody>
-          <a:bodyPr/>
-          <a:lstStyle/>
-          <a:p>
-            <a:endParaRPr lang="pt-BR"/>
+          <p:cNvPr id="2" name="CaixaDeTexto 1">
+            <a:extLst>
+              <a:ext uri="{FF2B5EF4-FFF2-40B4-BE49-F238E27FC236}">
+                <a16:creationId xmlns:a16="http://schemas.microsoft.com/office/drawing/2014/main" id="{18306691-FCB4-486D-981E-7E2BE2A15254}"/>
+              </a:ext>
+            </a:extLst>
+          </p:cNvPr>
+          <p:cNvSpPr txBox="1"/>
+          <p:nvPr/>
+        </p:nvSpPr>
+        <p:spPr>
+          <a:xfrm>
+            <a:off x="1252025" y="381614"/>
+            <a:ext cx="1980414" cy="369332"/>
+          </a:xfrm>
+          <a:prstGeom prst="rect">
+            <a:avLst/>
+          </a:prstGeom>
+          <a:noFill/>
+        </p:spPr>
+        <p:txBody>
+          <a:bodyPr wrap="none" rtlCol="0">
+            <a:spAutoFit/>
+          </a:bodyPr>
+          <a:lstStyle/>
+          <a:p>
+            <a:r>
+              <a:rPr lang="pt-BR" dirty="0"/>
+              <a:t>Arena salva os pets</a:t>
+            </a:r>
+          </a:p>
+        </p:txBody>
+      </p:sp>
+      <p:sp>
+        <p:nvSpPr>
+          <p:cNvPr id="3" name="Retângulo 2">
+            <a:extLst>
+              <a:ext uri="{FF2B5EF4-FFF2-40B4-BE49-F238E27FC236}">
+                <a16:creationId xmlns:a16="http://schemas.microsoft.com/office/drawing/2014/main" id="{2AED8898-0D27-46F6-8B9A-30975E6562C4}"/>
+              </a:ext>
+            </a:extLst>
+          </p:cNvPr>
+          <p:cNvSpPr/>
+          <p:nvPr/>
+        </p:nvSpPr>
+        <p:spPr>
+          <a:xfrm>
+            <a:off x="168812" y="109080"/>
+            <a:ext cx="914400" cy="914400"/>
+          </a:xfrm>
+          <a:prstGeom prst="rect">
+            <a:avLst/>
+          </a:prstGeom>
+        </p:spPr>
+        <p:style>
+          <a:lnRef idx="2">
+            <a:schemeClr val="accent1">
+              <a:shade val="50000"/>
+            </a:schemeClr>
+          </a:lnRef>
+          <a:fillRef idx="1">
+            <a:schemeClr val="accent1"/>
+          </a:fillRef>
+          <a:effectRef idx="0">
+            <a:schemeClr val="accent1"/>
+          </a:effectRef>
+          <a:fontRef idx="minor">
+            <a:schemeClr val="lt1"/>
+          </a:fontRef>
+        </p:style>
+        <p:txBody>
+          <a:bodyPr rtlCol="0" anchor="ctr"/>
+          <a:lstStyle/>
+          <a:p>
+            <a:pPr algn="ctr"/>
+            <a:r>
+              <a:rPr lang="pt-BR" dirty="0"/>
+              <a:t>Criar logo do jogo</a:t>
+            </a:r>
+          </a:p>
+        </p:txBody>
+      </p:sp>
+      <p:sp>
+        <p:nvSpPr>
+          <p:cNvPr id="4" name="CaixaDeTexto 3">
+            <a:extLst>
+              <a:ext uri="{FF2B5EF4-FFF2-40B4-BE49-F238E27FC236}">
+                <a16:creationId xmlns:a16="http://schemas.microsoft.com/office/drawing/2014/main" id="{F5174A1A-9938-4A58-AF37-88731524FAAE}"/>
+              </a:ext>
+            </a:extLst>
+          </p:cNvPr>
+          <p:cNvSpPr txBox="1"/>
+          <p:nvPr/>
+        </p:nvSpPr>
+        <p:spPr>
+          <a:xfrm>
+            <a:off x="9917723" y="267286"/>
+            <a:ext cx="1397627" cy="369332"/>
+          </a:xfrm>
+          <a:prstGeom prst="rect">
+            <a:avLst/>
+          </a:prstGeom>
+          <a:noFill/>
+        </p:spPr>
+        <p:txBody>
+          <a:bodyPr wrap="none" rtlCol="0">
+            <a:spAutoFit/>
+          </a:bodyPr>
+          <a:lstStyle/>
+          <a:p>
+            <a:r>
+              <a:rPr lang="pt-BR" dirty="0"/>
+              <a:t>Android e PC</a:t>
+            </a:r>
+          </a:p>
+        </p:txBody>
+      </p:sp>
+      <p:sp>
+        <p:nvSpPr>
+          <p:cNvPr id="5" name="CaixaDeTexto 4">
+            <a:extLst>
+              <a:ext uri="{FF2B5EF4-FFF2-40B4-BE49-F238E27FC236}">
+                <a16:creationId xmlns:a16="http://schemas.microsoft.com/office/drawing/2014/main" id="{2BA108B8-C6EB-4E78-818D-C1BB6599BC55}"/>
+              </a:ext>
+            </a:extLst>
+          </p:cNvPr>
+          <p:cNvSpPr txBox="1"/>
+          <p:nvPr/>
+        </p:nvSpPr>
+        <p:spPr>
+          <a:xfrm>
+            <a:off x="1252025" y="838814"/>
+            <a:ext cx="3211457" cy="369332"/>
+          </a:xfrm>
+          <a:prstGeom prst="rect">
+            <a:avLst/>
+          </a:prstGeom>
+          <a:noFill/>
+        </p:spPr>
+        <p:txBody>
+          <a:bodyPr wrap="none" rtlCol="0">
+            <a:spAutoFit/>
+          </a:bodyPr>
+          <a:lstStyle/>
+          <a:p>
+            <a:r>
+              <a:rPr lang="pt-BR" dirty="0"/>
+              <a:t>Ação - crianças 5 – 10 (ESRB </a:t>
+            </a:r>
+            <a:r>
+              <a:rPr lang="pt-BR" dirty="0" err="1"/>
+              <a:t>eC</a:t>
+            </a:r>
+            <a:r>
+              <a:rPr lang="pt-BR" dirty="0"/>
+              <a:t>)</a:t>
+            </a:r>
+          </a:p>
+        </p:txBody>
+      </p:sp>
+      <p:sp>
+        <p:nvSpPr>
+          <p:cNvPr id="7" name="CaixaDeTexto 6">
+            <a:extLst>
+              <a:ext uri="{FF2B5EF4-FFF2-40B4-BE49-F238E27FC236}">
+                <a16:creationId xmlns:a16="http://schemas.microsoft.com/office/drawing/2014/main" id="{748A7786-A7EF-494F-B41F-EF52E49C4FAA}"/>
+              </a:ext>
+            </a:extLst>
+          </p:cNvPr>
+          <p:cNvSpPr txBox="1"/>
+          <p:nvPr/>
+        </p:nvSpPr>
+        <p:spPr>
+          <a:xfrm>
+            <a:off x="6396110" y="838814"/>
+            <a:ext cx="5795890" cy="3693319"/>
+          </a:xfrm>
+          <a:prstGeom prst="rect">
+            <a:avLst/>
+          </a:prstGeom>
+          <a:noFill/>
+        </p:spPr>
+        <p:txBody>
+          <a:bodyPr wrap="square" rtlCol="0">
+            <a:spAutoFit/>
+          </a:bodyPr>
+          <a:lstStyle/>
+          <a:p>
+            <a:r>
+              <a:rPr lang="pt-BR" dirty="0"/>
+              <a:t>A empresa de água da região foi destruída, o criadouro de cachorrinhos numa fazenda no Interior do Interior está em perigo. Arena é o último recurso dos cãezinhos. Arena deve correr atrás das nuvens carregadas para coletar água da chuva para os cãezinhos beberem, enquanto desvia de perigos como raios, telhas voando e granizo. Com a venda de água excedente para os vizinhos o robô pode ser melhorado com mais velocidade, reservatório maior, escudos, atiradeira contra telhas. O jogador ganha prestígio quando doa para a reforma da empresa de água, e ganha o jogo quando ela está funcionando. O jogador perde e vê seus cães com sede quando não consegue captar água suficiente.</a:t>
+            </a:r>
+          </a:p>
+        </p:txBody>
+      </p:sp>
+      <p:sp>
+        <p:nvSpPr>
+          <p:cNvPr id="9" name="Retângulo 8">
+            <a:extLst>
+              <a:ext uri="{FF2B5EF4-FFF2-40B4-BE49-F238E27FC236}">
+                <a16:creationId xmlns:a16="http://schemas.microsoft.com/office/drawing/2014/main" id="{90719BF4-A855-40DD-8C23-B513D12D23A4}"/>
+              </a:ext>
+            </a:extLst>
+          </p:cNvPr>
+          <p:cNvSpPr/>
+          <p:nvPr/>
+        </p:nvSpPr>
+        <p:spPr>
+          <a:xfrm>
+            <a:off x="245898" y="1296012"/>
+            <a:ext cx="3858814" cy="369333"/>
+          </a:xfrm>
+          <a:prstGeom prst="rect">
+            <a:avLst/>
+          </a:prstGeom>
+        </p:spPr>
+        <p:style>
+          <a:lnRef idx="2">
+            <a:schemeClr val="dk1">
+              <a:shade val="50000"/>
+            </a:schemeClr>
+          </a:lnRef>
+          <a:fillRef idx="1">
+            <a:schemeClr val="dk1"/>
+          </a:fillRef>
+          <a:effectRef idx="0">
+            <a:schemeClr val="dk1"/>
+          </a:effectRef>
+          <a:fontRef idx="minor">
+            <a:schemeClr val="lt1"/>
+          </a:fontRef>
+        </p:style>
+        <p:txBody>
+          <a:bodyPr rtlCol="0" anchor="ctr"/>
+          <a:lstStyle/>
+          <a:p>
+            <a:pPr algn="ctr"/>
+            <a:r>
+              <a:rPr lang="pt-BR" dirty="0"/>
+              <a:t>Companhia de água destruída</a:t>
+            </a:r>
+          </a:p>
+        </p:txBody>
+      </p:sp>
+      <p:sp>
+        <p:nvSpPr>
+          <p:cNvPr id="11" name="CaixaDeTexto 10">
+            <a:extLst>
+              <a:ext uri="{FF2B5EF4-FFF2-40B4-BE49-F238E27FC236}">
+                <a16:creationId xmlns:a16="http://schemas.microsoft.com/office/drawing/2014/main" id="{E0D8FE6B-8124-46EC-898E-31D473DB54EA}"/>
+              </a:ext>
+            </a:extLst>
+          </p:cNvPr>
+          <p:cNvSpPr txBox="1"/>
+          <p:nvPr/>
+        </p:nvSpPr>
+        <p:spPr>
+          <a:xfrm>
+            <a:off x="245898" y="6128156"/>
+            <a:ext cx="2255939" cy="369332"/>
+          </a:xfrm>
+          <a:prstGeom prst="rect">
+            <a:avLst/>
+          </a:prstGeom>
+          <a:noFill/>
+        </p:spPr>
+        <p:txBody>
+          <a:bodyPr wrap="none" rtlCol="0">
+            <a:spAutoFit/>
+          </a:bodyPr>
+          <a:lstStyle/>
+          <a:p>
+            <a:r>
+              <a:rPr lang="pt-BR" dirty="0"/>
+              <a:t>Diferenciais de venda:</a:t>
+            </a:r>
+          </a:p>
+        </p:txBody>
+      </p:sp>
+      <p:sp>
+        <p:nvSpPr>
+          <p:cNvPr id="12" name="CaixaDeTexto 11">
+            <a:extLst>
+              <a:ext uri="{FF2B5EF4-FFF2-40B4-BE49-F238E27FC236}">
+                <a16:creationId xmlns:a16="http://schemas.microsoft.com/office/drawing/2014/main" id="{64F3CC01-88D7-4FCC-979B-106935D73A3D}"/>
+              </a:ext>
+            </a:extLst>
+          </p:cNvPr>
+          <p:cNvSpPr txBox="1"/>
+          <p:nvPr/>
+        </p:nvSpPr>
+        <p:spPr>
+          <a:xfrm>
+            <a:off x="9488566" y="6312822"/>
+            <a:ext cx="2255939" cy="369332"/>
+          </a:xfrm>
+          <a:prstGeom prst="rect">
+            <a:avLst/>
+          </a:prstGeom>
+          <a:noFill/>
+        </p:spPr>
+        <p:txBody>
+          <a:bodyPr wrap="none" rtlCol="0">
+            <a:spAutoFit/>
+          </a:bodyPr>
+          <a:lstStyle/>
+          <a:p>
+            <a:r>
+              <a:rPr lang="pt-BR" dirty="0"/>
+              <a:t>Jogos similares: Mario</a:t>
+            </a:r>
+          </a:p>
+        </p:txBody>
+      </p:sp>
+      <p:sp>
+        <p:nvSpPr>
+          <p:cNvPr id="6" name="Retângulo 5">
+            <a:extLst>
+              <a:ext uri="{FF2B5EF4-FFF2-40B4-BE49-F238E27FC236}">
+                <a16:creationId xmlns:a16="http://schemas.microsoft.com/office/drawing/2014/main" id="{E3242D4B-0A4E-468A-90B7-59853DCA43FD}"/>
+              </a:ext>
+            </a:extLst>
+          </p:cNvPr>
+          <p:cNvSpPr/>
+          <p:nvPr/>
+        </p:nvSpPr>
+        <p:spPr>
+          <a:xfrm>
+            <a:off x="4597655" y="1480680"/>
+            <a:ext cx="914400" cy="914400"/>
+          </a:xfrm>
+          <a:prstGeom prst="rect">
+            <a:avLst/>
+          </a:prstGeom>
+        </p:spPr>
+        <p:style>
+          <a:lnRef idx="2">
+            <a:schemeClr val="accent1">
+              <a:shade val="50000"/>
+            </a:schemeClr>
+          </a:lnRef>
+          <a:fillRef idx="1">
+            <a:schemeClr val="accent1"/>
+          </a:fillRef>
+          <a:effectRef idx="0">
+            <a:schemeClr val="accent1"/>
+          </a:effectRef>
+          <a:fontRef idx="minor">
+            <a:schemeClr val="lt1"/>
+          </a:fontRef>
+        </p:style>
+        <p:txBody>
+          <a:bodyPr rtlCol="0" anchor="ctr"/>
+          <a:lstStyle/>
+          <a:p>
+            <a:pPr algn="ctr"/>
+            <a:r>
+              <a:rPr lang="pt-BR" dirty="0"/>
+              <a:t>ARENA</a:t>
+            </a:r>
+          </a:p>
+        </p:txBody>
+      </p:sp>
+      <p:pic>
+        <p:nvPicPr>
+          <p:cNvPr id="14" name="Imagem 13" descr="Uma imagem contendo edifício&#10;&#10;Descrição gerada automaticamente">
+            <a:extLst>
+              <a:ext uri="{FF2B5EF4-FFF2-40B4-BE49-F238E27FC236}">
+                <a16:creationId xmlns:a16="http://schemas.microsoft.com/office/drawing/2014/main" id="{F547CEA3-B38A-4173-AE9B-B72BE58A6F47}"/>
+              </a:ext>
+            </a:extLst>
+          </p:cNvPr>
+          <p:cNvPicPr>
+            <a:picLocks noChangeAspect="1"/>
+          </p:cNvPicPr>
+          <p:nvPr/>
+        </p:nvPicPr>
+        <p:blipFill>
+          <a:blip r:embed="rId2">
+            <a:extLst>
+              <a:ext uri="{28A0092B-C50C-407E-A947-70E740481C1C}">
+                <a14:useLocalDpi xmlns:a14="http://schemas.microsoft.com/office/drawing/2010/main" val="0"/>
+              </a:ext>
+            </a:extLst>
+          </a:blip>
+          <a:stretch>
+            <a:fillRect/>
+          </a:stretch>
+        </p:blipFill>
+        <p:spPr>
+          <a:xfrm>
+            <a:off x="234398" y="1739703"/>
+            <a:ext cx="3870314" cy="1309077"/>
+          </a:xfrm>
+          <a:prstGeom prst="rect">
+            <a:avLst/>
+          </a:prstGeom>
+        </p:spPr>
+      </p:pic>
+      <p:pic>
+        <p:nvPicPr>
+          <p:cNvPr id="16" name="Gráfico 15">
+            <a:extLst>
+              <a:ext uri="{FF2B5EF4-FFF2-40B4-BE49-F238E27FC236}">
+                <a16:creationId xmlns:a16="http://schemas.microsoft.com/office/drawing/2014/main" id="{DE2B4D15-737D-486C-AD2B-83819AF9452E}"/>
+              </a:ext>
+            </a:extLst>
+          </p:cNvPr>
+          <p:cNvPicPr>
+            <a:picLocks noChangeAspect="1"/>
+          </p:cNvPicPr>
+          <p:nvPr/>
+        </p:nvPicPr>
+        <p:blipFill>
+          <a:blip r:embed="rId3">
+            <a:extLst>
+              <a:ext uri="{28A0092B-C50C-407E-A947-70E740481C1C}">
+                <a14:useLocalDpi xmlns:a14="http://schemas.microsoft.com/office/drawing/2010/main" val="0"/>
+              </a:ext>
+              <a:ext uri="{96DAC541-7B7A-43D3-8B79-37D633B846F1}">
+                <asvg:svgBlip xmlns:asvg="http://schemas.microsoft.com/office/drawing/2016/SVG/main" r:embed="rId4"/>
+              </a:ext>
+            </a:extLst>
+          </a:blip>
+          <a:stretch>
+            <a:fillRect/>
+          </a:stretch>
+        </p:blipFill>
+        <p:spPr>
+          <a:xfrm>
+            <a:off x="3068568" y="3894313"/>
+            <a:ext cx="2711243" cy="1897870"/>
+          </a:xfrm>
+          <a:prstGeom prst="rect">
+            <a:avLst/>
+          </a:prstGeom>
+        </p:spPr>
+      </p:pic>
+      <p:sp>
+        <p:nvSpPr>
+          <p:cNvPr id="17" name="Retângulo 16">
+            <a:extLst>
+              <a:ext uri="{FF2B5EF4-FFF2-40B4-BE49-F238E27FC236}">
+                <a16:creationId xmlns:a16="http://schemas.microsoft.com/office/drawing/2014/main" id="{D8D509EB-5CF3-4768-95DE-E2307C2CE883}"/>
+              </a:ext>
+            </a:extLst>
+          </p:cNvPr>
+          <p:cNvSpPr/>
+          <p:nvPr/>
+        </p:nvSpPr>
+        <p:spPr>
+          <a:xfrm>
+            <a:off x="3493653" y="3408236"/>
+            <a:ext cx="1936143" cy="369333"/>
+          </a:xfrm>
+          <a:prstGeom prst="rect">
+            <a:avLst/>
+          </a:prstGeom>
+        </p:spPr>
+        <p:style>
+          <a:lnRef idx="2">
+            <a:schemeClr val="dk1">
+              <a:shade val="50000"/>
+            </a:schemeClr>
+          </a:lnRef>
+          <a:fillRef idx="1">
+            <a:schemeClr val="dk1"/>
+          </a:fillRef>
+          <a:effectRef idx="0">
+            <a:schemeClr val="dk1"/>
+          </a:effectRef>
+          <a:fontRef idx="minor">
+            <a:schemeClr val="lt1"/>
+          </a:fontRef>
+        </p:style>
+        <p:txBody>
+          <a:bodyPr rtlCol="0" anchor="ctr"/>
+          <a:lstStyle/>
+          <a:p>
+            <a:pPr algn="ctr"/>
+            <a:r>
+              <a:rPr lang="pt-BR" dirty="0"/>
+              <a:t>Fazenda</a:t>
+            </a:r>
+          </a:p>
+        </p:txBody>
+      </p:sp>
+      <p:sp>
+        <p:nvSpPr>
+          <p:cNvPr id="18" name="Retângulo 17">
+            <a:extLst>
+              <a:ext uri="{FF2B5EF4-FFF2-40B4-BE49-F238E27FC236}">
+                <a16:creationId xmlns:a16="http://schemas.microsoft.com/office/drawing/2014/main" id="{62B8F30C-DA38-4904-8E8F-2962D88FDF49}"/>
+              </a:ext>
+            </a:extLst>
+          </p:cNvPr>
+          <p:cNvSpPr/>
+          <p:nvPr/>
+        </p:nvSpPr>
+        <p:spPr>
+          <a:xfrm>
+            <a:off x="459466" y="4074933"/>
+            <a:ext cx="1270859" cy="914400"/>
+          </a:xfrm>
+          <a:prstGeom prst="rect">
+            <a:avLst/>
+          </a:prstGeom>
+        </p:spPr>
+        <p:style>
+          <a:lnRef idx="2">
+            <a:schemeClr val="accent1">
+              <a:shade val="50000"/>
+            </a:schemeClr>
+          </a:lnRef>
+          <a:fillRef idx="1">
+            <a:schemeClr val="accent1"/>
+          </a:fillRef>
+          <a:effectRef idx="0">
+            <a:schemeClr val="accent1"/>
+          </a:effectRef>
+          <a:fontRef idx="minor">
+            <a:schemeClr val="lt1"/>
+          </a:fontRef>
+        </p:style>
+        <p:txBody>
+          <a:bodyPr rtlCol="0" anchor="ctr"/>
+          <a:lstStyle/>
+          <a:p>
+            <a:pPr algn="ctr"/>
+            <a:r>
+              <a:rPr lang="pt-BR" dirty="0"/>
+              <a:t>Filhotinhos</a:t>
+            </a:r>
           </a:p>
         </p:txBody>
       </p:sp>
     </p:spTree>
     <p:extLst>
       <p:ext uri="{BB962C8B-B14F-4D97-AF65-F5344CB8AC3E}">
-        <p14:creationId xmlns:p14="http://schemas.microsoft.com/office/powerpoint/2010/main" val="789463965"/>
+        <p14:creationId xmlns:p14="http://schemas.microsoft.com/office/powerpoint/2010/main" val="2980333560"/>
       </p:ext>
     </p:extLst>
   </p:cSld>
@@ -3420,432 +3908,119 @@
       </p:grpSpPr>
       <p:sp>
         <p:nvSpPr>
-          <p:cNvPr id="2" name="CaixaDeTexto 1">
-            <a:extLst>
-              <a:ext uri="{FF2B5EF4-FFF2-40B4-BE49-F238E27FC236}">
-                <a16:creationId xmlns:a16="http://schemas.microsoft.com/office/drawing/2014/main" id="{18306691-FCB4-486D-981E-7E2BE2A15254}"/>
-              </a:ext>
-            </a:extLst>
-          </p:cNvPr>
-          <p:cNvSpPr txBox="1"/>
-          <p:nvPr/>
-        </p:nvSpPr>
-        <p:spPr>
-          <a:xfrm>
-            <a:off x="1252025" y="381614"/>
-            <a:ext cx="2106667" cy="369332"/>
-          </a:xfrm>
-          <a:prstGeom prst="rect">
-            <a:avLst/>
-          </a:prstGeom>
-          <a:noFill/>
-        </p:spPr>
-        <p:txBody>
-          <a:bodyPr wrap="none" rtlCol="0">
-            <a:spAutoFit/>
-          </a:bodyPr>
+          <p:cNvPr id="2" name="Título 1">
+            <a:extLst>
+              <a:ext uri="{FF2B5EF4-FFF2-40B4-BE49-F238E27FC236}">
+                <a16:creationId xmlns:a16="http://schemas.microsoft.com/office/drawing/2014/main" id="{43A1ECB8-4CC4-4939-AFF2-2279E895EEBF}"/>
+              </a:ext>
+            </a:extLst>
+          </p:cNvPr>
+          <p:cNvSpPr>
+            <a:spLocks noGrp="1"/>
+          </p:cNvSpPr>
+          <p:nvPr>
+            <p:ph type="title"/>
+          </p:nvPr>
+        </p:nvSpPr>
+        <p:spPr/>
+        <p:txBody>
+          <a:bodyPr/>
+          <a:lstStyle/>
+          <a:p>
+            <a:endParaRPr lang="pt-BR"/>
+          </a:p>
+        </p:txBody>
+      </p:sp>
+      <p:sp>
+        <p:nvSpPr>
+          <p:cNvPr id="3" name="Espaço Reservado para Conteúdo 2">
+            <a:extLst>
+              <a:ext uri="{FF2B5EF4-FFF2-40B4-BE49-F238E27FC236}">
+                <a16:creationId xmlns:a16="http://schemas.microsoft.com/office/drawing/2014/main" id="{4B8D3587-67F6-4F72-8129-CCF9D838A32B}"/>
+              </a:ext>
+            </a:extLst>
+          </p:cNvPr>
+          <p:cNvSpPr>
+            <a:spLocks noGrp="1"/>
+          </p:cNvSpPr>
+          <p:nvPr>
+            <p:ph idx="1"/>
+          </p:nvPr>
+        </p:nvSpPr>
+        <p:spPr/>
+        <p:txBody>
+          <a:bodyPr/>
           <a:lstStyle/>
           <a:p>
             <a:r>
               <a:rPr lang="pt-BR" dirty="0"/>
-              <a:t>Jogo do enche balde</a:t>
-            </a:r>
-          </a:p>
-        </p:txBody>
-      </p:sp>
-      <p:sp>
-        <p:nvSpPr>
-          <p:cNvPr id="3" name="Retângulo 2">
-            <a:extLst>
-              <a:ext uri="{FF2B5EF4-FFF2-40B4-BE49-F238E27FC236}">
-                <a16:creationId xmlns:a16="http://schemas.microsoft.com/office/drawing/2014/main" id="{2AED8898-0D27-46F6-8B9A-30975E6562C4}"/>
-              </a:ext>
-            </a:extLst>
-          </p:cNvPr>
-          <p:cNvSpPr/>
-          <p:nvPr/>
-        </p:nvSpPr>
-        <p:spPr>
-          <a:xfrm>
-            <a:off x="168812" y="109080"/>
-            <a:ext cx="914400" cy="914400"/>
-          </a:xfrm>
-          <a:prstGeom prst="rect">
-            <a:avLst/>
-          </a:prstGeom>
-        </p:spPr>
-        <p:style>
-          <a:lnRef idx="2">
-            <a:schemeClr val="accent1">
-              <a:shade val="50000"/>
-            </a:schemeClr>
-          </a:lnRef>
-          <a:fillRef idx="1">
-            <a:schemeClr val="accent1"/>
-          </a:fillRef>
-          <a:effectRef idx="0">
-            <a:schemeClr val="accent1"/>
-          </a:effectRef>
-          <a:fontRef idx="minor">
-            <a:schemeClr val="lt1"/>
-          </a:fontRef>
-        </p:style>
-        <p:txBody>
-          <a:bodyPr rtlCol="0" anchor="ctr"/>
-          <a:lstStyle/>
-          <a:p>
-            <a:pPr algn="ctr"/>
+              <a:t>Link foto da </a:t>
+            </a:r>
+            <a:r>
+              <a:rPr lang="pt-BR" dirty="0" err="1"/>
+              <a:t>Sabesb</a:t>
+            </a:r>
             <a:r>
               <a:rPr lang="pt-BR" dirty="0"/>
-              <a:t>Criar logo do jogo</a:t>
-            </a:r>
-          </a:p>
-        </p:txBody>
-      </p:sp>
-      <p:sp>
-        <p:nvSpPr>
-          <p:cNvPr id="4" name="CaixaDeTexto 3">
-            <a:extLst>
-              <a:ext uri="{FF2B5EF4-FFF2-40B4-BE49-F238E27FC236}">
-                <a16:creationId xmlns:a16="http://schemas.microsoft.com/office/drawing/2014/main" id="{F5174A1A-9938-4A58-AF37-88731524FAAE}"/>
-              </a:ext>
-            </a:extLst>
-          </p:cNvPr>
-          <p:cNvSpPr txBox="1"/>
-          <p:nvPr/>
-        </p:nvSpPr>
-        <p:spPr>
-          <a:xfrm>
-            <a:off x="9917723" y="267286"/>
-            <a:ext cx="1397627" cy="369332"/>
-          </a:xfrm>
-          <a:prstGeom prst="rect">
-            <a:avLst/>
-          </a:prstGeom>
-          <a:noFill/>
-        </p:spPr>
-        <p:txBody>
-          <a:bodyPr wrap="none" rtlCol="0">
-            <a:spAutoFit/>
-          </a:bodyPr>
-          <a:lstStyle/>
+              <a:t>: </a:t>
+            </a:r>
+            <a:r>
+              <a:rPr lang="pt-BR" dirty="0">
+                <a:hlinkClick r:id="rId2"/>
+              </a:rPr>
+              <a:t>http://site.sabesp.com.br/site/interna/Default.aspx?secaoId=47</a:t>
+            </a:r>
+            <a:endParaRPr lang="pt-BR" dirty="0"/>
+          </a:p>
           <a:p>
             <a:r>
               <a:rPr lang="pt-BR" dirty="0"/>
-              <a:t>Android e PC</a:t>
-            </a:r>
-          </a:p>
-        </p:txBody>
-      </p:sp>
-      <p:sp>
-        <p:nvSpPr>
-          <p:cNvPr id="5" name="CaixaDeTexto 4">
-            <a:extLst>
-              <a:ext uri="{FF2B5EF4-FFF2-40B4-BE49-F238E27FC236}">
-                <a16:creationId xmlns:a16="http://schemas.microsoft.com/office/drawing/2014/main" id="{2BA108B8-C6EB-4E78-818D-C1BB6599BC55}"/>
-              </a:ext>
-            </a:extLst>
-          </p:cNvPr>
-          <p:cNvSpPr txBox="1"/>
-          <p:nvPr/>
-        </p:nvSpPr>
-        <p:spPr>
-          <a:xfrm>
-            <a:off x="1252025" y="838814"/>
-            <a:ext cx="3211457" cy="369332"/>
-          </a:xfrm>
-          <a:prstGeom prst="rect">
-            <a:avLst/>
-          </a:prstGeom>
-          <a:noFill/>
-        </p:spPr>
-        <p:txBody>
-          <a:bodyPr wrap="none" rtlCol="0">
-            <a:spAutoFit/>
-          </a:bodyPr>
-          <a:lstStyle/>
-          <a:p>
-            <a:r>
-              <a:rPr lang="pt-BR" dirty="0"/>
-              <a:t>Ação - crianças 5 – 10 (ESRB </a:t>
-            </a:r>
-            <a:r>
-              <a:rPr lang="pt-BR" dirty="0" err="1"/>
-              <a:t>eC</a:t>
-            </a:r>
-            <a:r>
-              <a:rPr lang="pt-BR" dirty="0"/>
-              <a:t>)</a:t>
-            </a:r>
-          </a:p>
-        </p:txBody>
-      </p:sp>
-      <p:sp>
-        <p:nvSpPr>
-          <p:cNvPr id="7" name="CaixaDeTexto 6">
-            <a:extLst>
-              <a:ext uri="{FF2B5EF4-FFF2-40B4-BE49-F238E27FC236}">
-                <a16:creationId xmlns:a16="http://schemas.microsoft.com/office/drawing/2014/main" id="{748A7786-A7EF-494F-B41F-EF52E49C4FAA}"/>
-              </a:ext>
-            </a:extLst>
-          </p:cNvPr>
-          <p:cNvSpPr txBox="1"/>
-          <p:nvPr/>
-        </p:nvSpPr>
-        <p:spPr>
-          <a:xfrm>
-            <a:off x="6396110" y="838814"/>
-            <a:ext cx="5795890" cy="3970318"/>
-          </a:xfrm>
-          <a:prstGeom prst="rect">
-            <a:avLst/>
-          </a:prstGeom>
-          <a:noFill/>
-        </p:spPr>
-        <p:txBody>
-          <a:bodyPr wrap="square" rtlCol="0">
-            <a:spAutoFit/>
-          </a:bodyPr>
-          <a:lstStyle/>
-          <a:p>
-            <a:r>
-              <a:rPr lang="pt-BR" dirty="0"/>
-              <a:t>A empresa de água da região foi destruída, o criadouro de cachorrinhos numa fazenda no Interior do Interior está em perigo. Robô “NOME” é o último recurso dos cãezinhos. “NOME” deve correr atrás das nuvens carregadas para coletar água da chuva para os cãezinhos. “NOME” precisa desviar de perigos como raios, telhas voando e ??enchentes??. Com a venda de água excedente para os vizinhos o robô pode ser melhorado com mais velocidade, reservatório maior, escudos, atiradeira contra telhas. O jogador ganha prestígio quando doa para a reforma da empresa de água, e ganha o jogo quando ela está funcionando. O jogador perde e vê seus cães com sede quando não consegue captar água suficiente.</a:t>
-            </a:r>
+              <a:t>Link da foto da fazenda:</a:t>
+            </a:r>
+          </a:p>
+          <a:p>
+            <a:r>
+              <a:rPr lang="en-US" dirty="0"/>
+              <a:t>&lt;a </a:t>
+            </a:r>
+            <a:r>
+              <a:rPr lang="en-US" dirty="0" err="1"/>
+              <a:t>href</a:t>
+            </a:r>
+            <a:r>
+              <a:rPr lang="en-US" dirty="0"/>
+              <a:t>="https://www.vecteezy.com/free-vector/farm"&gt;Farm Vectors by </a:t>
+            </a:r>
+            <a:r>
+              <a:rPr lang="en-US" dirty="0" err="1"/>
+              <a:t>Vecteezy</a:t>
+            </a:r>
+            <a:r>
+              <a:rPr lang="en-US" dirty="0"/>
+              <a:t>&lt;/a&gt;</a:t>
+            </a:r>
+          </a:p>
+          <a:p>
+            <a:r>
+              <a:rPr lang="en-US" dirty="0">
+                <a:hlinkClick r:id="rId3"/>
+              </a:rPr>
+              <a:t>https://www.vecteezy.com/vector-art/158283-farm-cartoon-landscape</a:t>
+            </a:r>
+            <a:endParaRPr lang="en-US" dirty="0"/>
+          </a:p>
+          <a:p>
+            <a:endParaRPr lang="en-US" dirty="0"/>
           </a:p>
           <a:p>
             <a:endParaRPr lang="pt-BR" dirty="0"/>
-          </a:p>
-        </p:txBody>
-      </p:sp>
-      <p:sp>
-        <p:nvSpPr>
-          <p:cNvPr id="8" name="Retângulo 7">
-            <a:extLst>
-              <a:ext uri="{FF2B5EF4-FFF2-40B4-BE49-F238E27FC236}">
-                <a16:creationId xmlns:a16="http://schemas.microsoft.com/office/drawing/2014/main" id="{A1F146A5-6651-4B69-8303-C1603FD3434D}"/>
-              </a:ext>
-            </a:extLst>
-          </p:cNvPr>
-          <p:cNvSpPr/>
-          <p:nvPr/>
-        </p:nvSpPr>
-        <p:spPr>
-          <a:xfrm>
-            <a:off x="2991926" y="3459814"/>
-            <a:ext cx="1605729" cy="1183472"/>
-          </a:xfrm>
-          <a:prstGeom prst="rect">
-            <a:avLst/>
-          </a:prstGeom>
-        </p:spPr>
-        <p:style>
-          <a:lnRef idx="2">
-            <a:schemeClr val="accent1">
-              <a:shade val="50000"/>
-            </a:schemeClr>
-          </a:lnRef>
-          <a:fillRef idx="1">
-            <a:schemeClr val="accent1"/>
-          </a:fillRef>
-          <a:effectRef idx="0">
-            <a:schemeClr val="accent1"/>
-          </a:effectRef>
-          <a:fontRef idx="minor">
-            <a:schemeClr val="lt1"/>
-          </a:fontRef>
-        </p:style>
-        <p:txBody>
-          <a:bodyPr rtlCol="0" anchor="ctr"/>
-          <a:lstStyle/>
-          <a:p>
-            <a:pPr algn="ctr"/>
-            <a:r>
-              <a:rPr lang="pt-BR" dirty="0"/>
-              <a:t>Cenário da fazenda com cachorrinhos fofos</a:t>
-            </a:r>
-          </a:p>
-        </p:txBody>
-      </p:sp>
-      <p:sp>
-        <p:nvSpPr>
-          <p:cNvPr id="9" name="Retângulo 8">
-            <a:extLst>
-              <a:ext uri="{FF2B5EF4-FFF2-40B4-BE49-F238E27FC236}">
-                <a16:creationId xmlns:a16="http://schemas.microsoft.com/office/drawing/2014/main" id="{90719BF4-A855-40DD-8C23-B513D12D23A4}"/>
-              </a:ext>
-            </a:extLst>
-          </p:cNvPr>
-          <p:cNvSpPr/>
-          <p:nvPr/>
-        </p:nvSpPr>
-        <p:spPr>
-          <a:xfrm>
-            <a:off x="492369" y="1480680"/>
-            <a:ext cx="1519311" cy="914400"/>
-          </a:xfrm>
-          <a:prstGeom prst="rect">
-            <a:avLst/>
-          </a:prstGeom>
-        </p:spPr>
-        <p:style>
-          <a:lnRef idx="2">
-            <a:schemeClr val="accent1">
-              <a:shade val="50000"/>
-            </a:schemeClr>
-          </a:lnRef>
-          <a:fillRef idx="1">
-            <a:schemeClr val="accent1"/>
-          </a:fillRef>
-          <a:effectRef idx="0">
-            <a:schemeClr val="accent1"/>
-          </a:effectRef>
-          <a:fontRef idx="minor">
-            <a:schemeClr val="lt1"/>
-          </a:fontRef>
-        </p:style>
-        <p:txBody>
-          <a:bodyPr rtlCol="0" anchor="ctr"/>
-          <a:lstStyle/>
-          <a:p>
-            <a:pPr algn="ctr"/>
-            <a:r>
-              <a:rPr lang="pt-BR" dirty="0"/>
-              <a:t>Cenário da empresa de água</a:t>
-            </a:r>
-          </a:p>
-        </p:txBody>
-      </p:sp>
-      <p:sp>
-        <p:nvSpPr>
-          <p:cNvPr id="10" name="Retângulo 9">
-            <a:extLst>
-              <a:ext uri="{FF2B5EF4-FFF2-40B4-BE49-F238E27FC236}">
-                <a16:creationId xmlns:a16="http://schemas.microsoft.com/office/drawing/2014/main" id="{49381173-6898-403B-9413-DFCE0DCB5B0C}"/>
-              </a:ext>
-            </a:extLst>
-          </p:cNvPr>
-          <p:cNvSpPr/>
-          <p:nvPr/>
-        </p:nvSpPr>
-        <p:spPr>
-          <a:xfrm>
-            <a:off x="5355101" y="1027052"/>
-            <a:ext cx="914400" cy="914400"/>
-          </a:xfrm>
-          <a:prstGeom prst="rect">
-            <a:avLst/>
-          </a:prstGeom>
-        </p:spPr>
-        <p:style>
-          <a:lnRef idx="2">
-            <a:schemeClr val="accent1">
-              <a:shade val="50000"/>
-            </a:schemeClr>
-          </a:lnRef>
-          <a:fillRef idx="1">
-            <a:schemeClr val="accent1"/>
-          </a:fillRef>
-          <a:effectRef idx="0">
-            <a:schemeClr val="accent1"/>
-          </a:effectRef>
-          <a:fontRef idx="minor">
-            <a:schemeClr val="lt1"/>
-          </a:fontRef>
-        </p:style>
-        <p:txBody>
-          <a:bodyPr rtlCol="0" anchor="ctr"/>
-          <a:lstStyle/>
-          <a:p>
-            <a:pPr algn="ctr"/>
-            <a:r>
-              <a:rPr lang="pt-BR" dirty="0"/>
-              <a:t>Robô</a:t>
-            </a:r>
-          </a:p>
-          <a:p>
-            <a:pPr algn="ctr"/>
-            <a:r>
-              <a:rPr lang="pt-BR" dirty="0"/>
-              <a:t>NOME</a:t>
-            </a:r>
-          </a:p>
-        </p:txBody>
-      </p:sp>
-      <p:sp>
-        <p:nvSpPr>
-          <p:cNvPr id="11" name="CaixaDeTexto 10">
-            <a:extLst>
-              <a:ext uri="{FF2B5EF4-FFF2-40B4-BE49-F238E27FC236}">
-                <a16:creationId xmlns:a16="http://schemas.microsoft.com/office/drawing/2014/main" id="{E0D8FE6B-8124-46EC-898E-31D473DB54EA}"/>
-              </a:ext>
-            </a:extLst>
-          </p:cNvPr>
-          <p:cNvSpPr txBox="1"/>
-          <p:nvPr/>
-        </p:nvSpPr>
-        <p:spPr>
-          <a:xfrm>
-            <a:off x="168812" y="5649854"/>
-            <a:ext cx="2255939" cy="369332"/>
-          </a:xfrm>
-          <a:prstGeom prst="rect">
-            <a:avLst/>
-          </a:prstGeom>
-          <a:noFill/>
-        </p:spPr>
-        <p:txBody>
-          <a:bodyPr wrap="none" rtlCol="0">
-            <a:spAutoFit/>
-          </a:bodyPr>
-          <a:lstStyle/>
-          <a:p>
-            <a:r>
-              <a:rPr lang="pt-BR" dirty="0"/>
-              <a:t>Diferenciais de venda:</a:t>
-            </a:r>
-          </a:p>
-        </p:txBody>
-      </p:sp>
-      <p:sp>
-        <p:nvSpPr>
-          <p:cNvPr id="12" name="CaixaDeTexto 11">
-            <a:extLst>
-              <a:ext uri="{FF2B5EF4-FFF2-40B4-BE49-F238E27FC236}">
-                <a16:creationId xmlns:a16="http://schemas.microsoft.com/office/drawing/2014/main" id="{64F3CC01-88D7-4FCC-979B-106935D73A3D}"/>
-              </a:ext>
-            </a:extLst>
-          </p:cNvPr>
-          <p:cNvSpPr txBox="1"/>
-          <p:nvPr/>
-        </p:nvSpPr>
-        <p:spPr>
-          <a:xfrm>
-            <a:off x="9488566" y="6312822"/>
-            <a:ext cx="2255939" cy="369332"/>
-          </a:xfrm>
-          <a:prstGeom prst="rect">
-            <a:avLst/>
-          </a:prstGeom>
-          <a:noFill/>
-        </p:spPr>
-        <p:txBody>
-          <a:bodyPr wrap="none" rtlCol="0">
-            <a:spAutoFit/>
-          </a:bodyPr>
-          <a:lstStyle/>
-          <a:p>
-            <a:r>
-              <a:rPr lang="pt-BR" dirty="0"/>
-              <a:t>Jogos similares: Mario</a:t>
-            </a:r>
           </a:p>
         </p:txBody>
       </p:sp>
     </p:spTree>
     <p:extLst>
       <p:ext uri="{BB962C8B-B14F-4D97-AF65-F5344CB8AC3E}">
-        <p14:creationId xmlns:p14="http://schemas.microsoft.com/office/powerpoint/2010/main" val="2980333560"/>
+        <p14:creationId xmlns:p14="http://schemas.microsoft.com/office/powerpoint/2010/main" val="2943332440"/>
       </p:ext>
     </p:extLst>
   </p:cSld>

</xml_diff>